<commit_message>
First full draft including Electrical management
</commit_message>
<xml_diff>
--- a/Figures/Kinematics.pptx
+++ b/Figures/Kinematics.pptx
@@ -290,7 +290,8 @@
           <a:p>
             <a:fld id="{05FBD53F-3D84-4611-BB16-59CA7BC56085}" type="datetimeFigureOut">
               <a:rPr lang="en-US" smtClean="0"/>
-              <a:t>10/24/13</a:t>
+              <a:pPr/>
+              <a:t>10/29/2013</a:t>
             </a:fld>
             <a:endParaRPr lang="en-US"/>
           </a:p>
@@ -332,6 +333,7 @@
           <a:p>
             <a:fld id="{6670F171-217D-4C6B-A9FB-56D091E91E31}" type="slidenum">
               <a:rPr lang="en-US" smtClean="0"/>
+              <a:pPr/>
               <a:t>‹#›</a:t>
             </a:fld>
             <a:endParaRPr lang="en-US"/>
@@ -455,7 +457,8 @@
           <a:p>
             <a:fld id="{05FBD53F-3D84-4611-BB16-59CA7BC56085}" type="datetimeFigureOut">
               <a:rPr lang="en-US" smtClean="0"/>
-              <a:t>10/24/13</a:t>
+              <a:pPr/>
+              <a:t>10/29/2013</a:t>
             </a:fld>
             <a:endParaRPr lang="en-US"/>
           </a:p>
@@ -497,6 +500,7 @@
           <a:p>
             <a:fld id="{6670F171-217D-4C6B-A9FB-56D091E91E31}" type="slidenum">
               <a:rPr lang="en-US" smtClean="0"/>
+              <a:pPr/>
               <a:t>‹#›</a:t>
             </a:fld>
             <a:endParaRPr lang="en-US"/>
@@ -630,7 +634,8 @@
           <a:p>
             <a:fld id="{05FBD53F-3D84-4611-BB16-59CA7BC56085}" type="datetimeFigureOut">
               <a:rPr lang="en-US" smtClean="0"/>
-              <a:t>10/24/13</a:t>
+              <a:pPr/>
+              <a:t>10/29/2013</a:t>
             </a:fld>
             <a:endParaRPr lang="en-US"/>
           </a:p>
@@ -672,6 +677,7 @@
           <a:p>
             <a:fld id="{6670F171-217D-4C6B-A9FB-56D091E91E31}" type="slidenum">
               <a:rPr lang="en-US" smtClean="0"/>
+              <a:pPr/>
               <a:t>‹#›</a:t>
             </a:fld>
             <a:endParaRPr lang="en-US"/>
@@ -795,7 +801,8 @@
           <a:p>
             <a:fld id="{05FBD53F-3D84-4611-BB16-59CA7BC56085}" type="datetimeFigureOut">
               <a:rPr lang="en-US" smtClean="0"/>
-              <a:t>10/24/13</a:t>
+              <a:pPr/>
+              <a:t>10/29/2013</a:t>
             </a:fld>
             <a:endParaRPr lang="en-US"/>
           </a:p>
@@ -837,6 +844,7 @@
           <a:p>
             <a:fld id="{6670F171-217D-4C6B-A9FB-56D091E91E31}" type="slidenum">
               <a:rPr lang="en-US" smtClean="0"/>
+              <a:pPr/>
               <a:t>‹#›</a:t>
             </a:fld>
             <a:endParaRPr lang="en-US"/>
@@ -1036,7 +1044,8 @@
           <a:p>
             <a:fld id="{05FBD53F-3D84-4611-BB16-59CA7BC56085}" type="datetimeFigureOut">
               <a:rPr lang="en-US" smtClean="0"/>
-              <a:t>10/24/13</a:t>
+              <a:pPr/>
+              <a:t>10/29/2013</a:t>
             </a:fld>
             <a:endParaRPr lang="en-US"/>
           </a:p>
@@ -1078,6 +1087,7 @@
           <a:p>
             <a:fld id="{6670F171-217D-4C6B-A9FB-56D091E91E31}" type="slidenum">
               <a:rPr lang="en-US" smtClean="0"/>
+              <a:pPr/>
               <a:t>‹#›</a:t>
             </a:fld>
             <a:endParaRPr lang="en-US"/>
@@ -1319,7 +1329,8 @@
           <a:p>
             <a:fld id="{05FBD53F-3D84-4611-BB16-59CA7BC56085}" type="datetimeFigureOut">
               <a:rPr lang="en-US" smtClean="0"/>
-              <a:t>10/24/13</a:t>
+              <a:pPr/>
+              <a:t>10/29/2013</a:t>
             </a:fld>
             <a:endParaRPr lang="en-US"/>
           </a:p>
@@ -1361,6 +1372,7 @@
           <a:p>
             <a:fld id="{6670F171-217D-4C6B-A9FB-56D091E91E31}" type="slidenum">
               <a:rPr lang="en-US" smtClean="0"/>
+              <a:pPr/>
               <a:t>‹#›</a:t>
             </a:fld>
             <a:endParaRPr lang="en-US"/>
@@ -1736,7 +1748,8 @@
           <a:p>
             <a:fld id="{05FBD53F-3D84-4611-BB16-59CA7BC56085}" type="datetimeFigureOut">
               <a:rPr lang="en-US" smtClean="0"/>
-              <a:t>10/24/13</a:t>
+              <a:pPr/>
+              <a:t>10/29/2013</a:t>
             </a:fld>
             <a:endParaRPr lang="en-US"/>
           </a:p>
@@ -1778,6 +1791,7 @@
           <a:p>
             <a:fld id="{6670F171-217D-4C6B-A9FB-56D091E91E31}" type="slidenum">
               <a:rPr lang="en-US" smtClean="0"/>
+              <a:pPr/>
               <a:t>‹#›</a:t>
             </a:fld>
             <a:endParaRPr lang="en-US"/>
@@ -1849,7 +1863,8 @@
           <a:p>
             <a:fld id="{05FBD53F-3D84-4611-BB16-59CA7BC56085}" type="datetimeFigureOut">
               <a:rPr lang="en-US" smtClean="0"/>
-              <a:t>10/24/13</a:t>
+              <a:pPr/>
+              <a:t>10/29/2013</a:t>
             </a:fld>
             <a:endParaRPr lang="en-US"/>
           </a:p>
@@ -1891,6 +1906,7 @@
           <a:p>
             <a:fld id="{6670F171-217D-4C6B-A9FB-56D091E91E31}" type="slidenum">
               <a:rPr lang="en-US" smtClean="0"/>
+              <a:pPr/>
               <a:t>‹#›</a:t>
             </a:fld>
             <a:endParaRPr lang="en-US"/>
@@ -1939,7 +1955,8 @@
           <a:p>
             <a:fld id="{05FBD53F-3D84-4611-BB16-59CA7BC56085}" type="datetimeFigureOut">
               <a:rPr lang="en-US" smtClean="0"/>
-              <a:t>10/24/13</a:t>
+              <a:pPr/>
+              <a:t>10/29/2013</a:t>
             </a:fld>
             <a:endParaRPr lang="en-US"/>
           </a:p>
@@ -1981,6 +1998,7 @@
           <a:p>
             <a:fld id="{6670F171-217D-4C6B-A9FB-56D091E91E31}" type="slidenum">
               <a:rPr lang="en-US" smtClean="0"/>
+              <a:pPr/>
               <a:t>‹#›</a:t>
             </a:fld>
             <a:endParaRPr lang="en-US"/>
@@ -2211,7 +2229,8 @@
           <a:p>
             <a:fld id="{05FBD53F-3D84-4611-BB16-59CA7BC56085}" type="datetimeFigureOut">
               <a:rPr lang="en-US" smtClean="0"/>
-              <a:t>10/24/13</a:t>
+              <a:pPr/>
+              <a:t>10/29/2013</a:t>
             </a:fld>
             <a:endParaRPr lang="en-US"/>
           </a:p>
@@ -2253,6 +2272,7 @@
           <a:p>
             <a:fld id="{6670F171-217D-4C6B-A9FB-56D091E91E31}" type="slidenum">
               <a:rPr lang="en-US" smtClean="0"/>
+              <a:pPr/>
               <a:t>‹#›</a:t>
             </a:fld>
             <a:endParaRPr lang="en-US"/>
@@ -2459,7 +2479,8 @@
           <a:p>
             <a:fld id="{05FBD53F-3D84-4611-BB16-59CA7BC56085}" type="datetimeFigureOut">
               <a:rPr lang="en-US" smtClean="0"/>
-              <a:t>10/24/13</a:t>
+              <a:pPr/>
+              <a:t>10/29/2013</a:t>
             </a:fld>
             <a:endParaRPr lang="en-US"/>
           </a:p>
@@ -2501,6 +2522,7 @@
           <a:p>
             <a:fld id="{6670F171-217D-4C6B-A9FB-56D091E91E31}" type="slidenum">
               <a:rPr lang="en-US" smtClean="0"/>
+              <a:pPr/>
               <a:t>‹#›</a:t>
             </a:fld>
             <a:endParaRPr lang="en-US"/>
@@ -2667,7 +2689,8 @@
           <a:p>
             <a:fld id="{05FBD53F-3D84-4611-BB16-59CA7BC56085}" type="datetimeFigureOut">
               <a:rPr lang="en-US" smtClean="0"/>
-              <a:t>10/24/13</a:t>
+              <a:pPr/>
+              <a:t>10/29/2013</a:t>
             </a:fld>
             <a:endParaRPr lang="en-US"/>
           </a:p>
@@ -2745,6 +2768,7 @@
           <a:p>
             <a:fld id="{6670F171-217D-4C6B-A9FB-56D091E91E31}" type="slidenum">
               <a:rPr lang="en-US" smtClean="0"/>
+              <a:pPr/>
               <a:t>‹#›</a:t>
             </a:fld>
             <a:endParaRPr lang="en-US"/>
@@ -3037,101 +3061,6 @@
           <a:chExt cx="0" cy="0"/>
         </a:xfrm>
       </p:grpSpPr>
-      <p:graphicFrame>
-        <p:nvGraphicFramePr>
-          <p:cNvPr id="25651" name="Object 51"/>
-          <p:cNvGraphicFramePr>
-            <a:graphicFrameLocks noChangeAspect="1"/>
-          </p:cNvGraphicFramePr>
-          <p:nvPr/>
-        </p:nvGraphicFramePr>
-        <p:xfrm>
-          <a:off x="5329238" y="3059113"/>
-          <a:ext cx="2995612" cy="2773362"/>
-        </p:xfrm>
-        <a:graphic>
-          <a:graphicData uri="http://schemas.openxmlformats.org/presentationml/2006/ole">
-            <mc:AlternateContent xmlns:mc="http://schemas.openxmlformats.org/markup-compatibility/2006">
-              <mc:Choice xmlns:v="urn:schemas-microsoft-com:vml" Requires="v">
-                <p:oleObj spid="_x0000_s1092" name="Bitmap Image" r:id="rId3" imgW="2994920" imgH="2773920" progId="Paint.Picture">
-                  <p:embed/>
-                </p:oleObj>
-              </mc:Choice>
-              <mc:Fallback>
-                <p:oleObj name="Bitmap Image" r:id="rId3" imgW="2994920" imgH="2773920" progId="Paint.Picture">
-                  <p:embed/>
-                  <p:pic>
-                    <p:nvPicPr>
-                      <p:cNvPr id="0" name="Picture 2"/>
-                      <p:cNvPicPr>
-                        <a:picLocks noChangeAspect="1" noChangeArrowheads="1"/>
-                      </p:cNvPicPr>
-                      <p:nvPr/>
-                    </p:nvPicPr>
-                    <p:blipFill>
-                      <a:blip r:embed="rId4">
-                        <a:extLst>
-                          <a:ext uri="{28A0092B-C50C-407E-A947-70E740481C1C}">
-                            <a14:useLocalDpi xmlns:a14="http://schemas.microsoft.com/office/drawing/2010/main" val="0"/>
-                          </a:ext>
-                        </a:extLst>
-                      </a:blip>
-                      <a:srcRect/>
-                      <a:stretch>
-                        <a:fillRect/>
-                      </a:stretch>
-                    </p:blipFill>
-                    <p:spPr bwMode="auto">
-                      <a:xfrm>
-                        <a:off x="5329238" y="3059113"/>
-                        <a:ext cx="2995612" cy="2773362"/>
-                      </a:xfrm>
-                      <a:prstGeom prst="rect">
-                        <a:avLst/>
-                      </a:prstGeom>
-                      <a:noFill/>
-                      <a:ln>
-                        <a:noFill/>
-                      </a:ln>
-                      <a:effectLst/>
-                      <a:extLst>
-                        <a:ext uri="{909E8E84-426E-40dd-AFC4-6F175D3DCCD1}">
-                          <a14:hiddenFill xmlns:a14="http://schemas.microsoft.com/office/drawing/2010/main">
-                            <a:solidFill>
-                              <a:schemeClr val="accent1"/>
-                            </a:solidFill>
-                          </a14:hiddenFill>
-                        </a:ext>
-                        <a:ext uri="{91240B29-F687-4f45-9708-019B960494DF}">
-                          <a14:hiddenLine xmlns:a14="http://schemas.microsoft.com/office/drawing/2010/main" w="9525">
-                            <a:solidFill>
-                              <a:schemeClr val="tx1"/>
-                            </a:solidFill>
-                            <a:miter lim="800000"/>
-                            <a:headEnd/>
-                            <a:tailEnd/>
-                          </a14:hiddenLine>
-                        </a:ext>
-                        <a:ext uri="{AF507438-7753-43e0-B8FC-AC1667EBCBE1}">
-                          <a14:hiddenEffects xmlns:a14="http://schemas.microsoft.com/office/drawing/2010/main">
-                            <a:effectLst>
-                              <a:outerShdw blurRad="63500" dist="38099" dir="2700000" algn="ctr" rotWithShape="0">
-                                <a:schemeClr val="bg2">
-                                  <a:alpha val="74998"/>
-                                </a:schemeClr>
-                              </a:outerShdw>
-                            </a:effectLst>
-                          </a14:hiddenEffects>
-                        </a:ext>
-                      </a:extLst>
-                    </p:spPr>
-                  </p:pic>
-                </p:oleObj>
-              </mc:Fallback>
-            </mc:AlternateContent>
-          </a:graphicData>
-        </a:graphic>
-      </p:graphicFrame>
       <p:grpSp>
         <p:nvGrpSpPr>
           <p:cNvPr id="2" name="Group 56"/>
@@ -3142,7 +3071,7 @@
         </p:nvGrpSpPr>
         <p:grpSpPr bwMode="auto">
           <a:xfrm>
-            <a:off x="595313" y="230188"/>
+            <a:off x="3429000" y="2514600"/>
             <a:ext cx="2835275" cy="2732087"/>
             <a:chOff x="375" y="145"/>
             <a:chExt cx="1786" cy="1721"/>
@@ -3574,59 +3503,9 @@
           </p:xfrm>
           <a:graphic>
             <a:graphicData uri="http://schemas.openxmlformats.org/presentationml/2006/ole">
-              <mc:AlternateContent xmlns:mc="http://schemas.openxmlformats.org/markup-compatibility/2006">
-                <mc:Choice xmlns:v="urn:schemas-microsoft-com:vml" Requires="v">
-                  <p:oleObj spid="_x0000_s1093" name="Equation" r:id="rId5" imgW="190440" imgH="266400" progId="Equation.DSMT4">
-                    <p:embed/>
-                  </p:oleObj>
-                </mc:Choice>
-                <mc:Fallback>
-                  <p:oleObj name="Equation" r:id="rId5" imgW="190440" imgH="266400" progId="Equation.DSMT4">
-                    <p:embed/>
-                    <p:pic>
-                      <p:nvPicPr>
-                        <p:cNvPr id="0" name="Picture 4"/>
-                        <p:cNvPicPr>
-                          <a:picLocks noChangeAspect="1" noChangeArrowheads="1"/>
-                        </p:cNvPicPr>
-                        <p:nvPr/>
-                      </p:nvPicPr>
-                      <p:blipFill>
-                        <a:blip r:embed="rId6">
-                          <a:extLst>
-                            <a:ext uri="{28A0092B-C50C-407E-A947-70E740481C1C}">
-                              <a14:useLocalDpi xmlns:a14="http://schemas.microsoft.com/office/drawing/2010/main" val="0"/>
-                            </a:ext>
-                          </a:extLst>
-                        </a:blip>
-                        <a:srcRect/>
-                        <a:stretch>
-                          <a:fillRect/>
-                        </a:stretch>
-                      </p:blipFill>
-                      <p:spPr bwMode="auto">
-                        <a:xfrm>
-                          <a:off x="1138" y="179"/>
-                          <a:ext cx="120" cy="168"/>
-                        </a:xfrm>
-                        <a:prstGeom prst="rect">
-                          <a:avLst/>
-                        </a:prstGeom>
-                        <a:noFill/>
-                        <a:extLst>
-                          <a:ext uri="{909E8E84-426E-40dd-AFC4-6F175D3DCCD1}">
-                            <a14:hiddenFill xmlns:a14="http://schemas.microsoft.com/office/drawing/2010/main">
-                              <a:solidFill>
-                                <a:srgbClr val="FFFFFF"/>
-                              </a:solidFill>
-                            </a14:hiddenFill>
-                          </a:ext>
-                        </a:extLst>
-                      </p:spPr>
-                    </p:pic>
-                  </p:oleObj>
-                </mc:Fallback>
-              </mc:AlternateContent>
+              <p:oleObj spid="_x0000_s1093" name="Equation" r:id="rId3" imgW="190477" imgH="266448" progId="Equation.DSMT4">
+                <p:embed/>
+              </p:oleObj>
             </a:graphicData>
           </a:graphic>
         </p:graphicFrame>
@@ -3644,59 +3523,9 @@
           </p:xfrm>
           <a:graphic>
             <a:graphicData uri="http://schemas.openxmlformats.org/presentationml/2006/ole">
-              <mc:AlternateContent xmlns:mc="http://schemas.openxmlformats.org/markup-compatibility/2006">
-                <mc:Choice xmlns:v="urn:schemas-microsoft-com:vml" Requires="v">
-                  <p:oleObj spid="_x0000_s1094" name="Equation" r:id="rId7" imgW="177480" imgH="253800" progId="Equation.DSMT4">
-                    <p:embed/>
-                  </p:oleObj>
-                </mc:Choice>
-                <mc:Fallback>
-                  <p:oleObj name="Equation" r:id="rId7" imgW="177480" imgH="253800" progId="Equation.DSMT4">
-                    <p:embed/>
-                    <p:pic>
-                      <p:nvPicPr>
-                        <p:cNvPr id="0" name="Picture 5"/>
-                        <p:cNvPicPr>
-                          <a:picLocks noChangeAspect="1" noChangeArrowheads="1"/>
-                        </p:cNvPicPr>
-                        <p:nvPr/>
-                      </p:nvPicPr>
-                      <p:blipFill>
-                        <a:blip r:embed="rId8">
-                          <a:extLst>
-                            <a:ext uri="{28A0092B-C50C-407E-A947-70E740481C1C}">
-                              <a14:useLocalDpi xmlns:a14="http://schemas.microsoft.com/office/drawing/2010/main" val="0"/>
-                            </a:ext>
-                          </a:extLst>
-                        </a:blip>
-                        <a:srcRect/>
-                        <a:stretch>
-                          <a:fillRect/>
-                        </a:stretch>
-                      </p:blipFill>
-                      <p:spPr bwMode="auto">
-                        <a:xfrm>
-                          <a:off x="1354" y="491"/>
-                          <a:ext cx="112" cy="160"/>
-                        </a:xfrm>
-                        <a:prstGeom prst="rect">
-                          <a:avLst/>
-                        </a:prstGeom>
-                        <a:noFill/>
-                        <a:extLst>
-                          <a:ext uri="{909E8E84-426E-40dd-AFC4-6F175D3DCCD1}">
-                            <a14:hiddenFill xmlns:a14="http://schemas.microsoft.com/office/drawing/2010/main">
-                              <a:solidFill>
-                                <a:srgbClr val="FFFFFF"/>
-                              </a:solidFill>
-                            </a14:hiddenFill>
-                          </a:ext>
-                        </a:extLst>
-                      </p:spPr>
-                    </p:pic>
-                  </p:oleObj>
-                </mc:Fallback>
-              </mc:AlternateContent>
+              <p:oleObj spid="_x0000_s1094" name="Equation" r:id="rId4" imgW="177708" imgH="253633" progId="Equation.DSMT4">
+                <p:embed/>
+              </p:oleObj>
             </a:graphicData>
           </a:graphic>
         </p:graphicFrame>
@@ -3800,59 +3629,9 @@
           </p:xfrm>
           <a:graphic>
             <a:graphicData uri="http://schemas.openxmlformats.org/presentationml/2006/ole">
-              <mc:AlternateContent xmlns:mc="http://schemas.openxmlformats.org/markup-compatibility/2006">
-                <mc:Choice xmlns:v="urn:schemas-microsoft-com:vml" Requires="v">
-                  <p:oleObj spid="_x0000_s1095" name="Equation" r:id="rId9" imgW="152280" imgH="241200" progId="Equation.DSMT4">
-                    <p:embed/>
-                  </p:oleObj>
-                </mc:Choice>
-                <mc:Fallback>
-                  <p:oleObj name="Equation" r:id="rId9" imgW="152280" imgH="241200" progId="Equation.DSMT4">
-                    <p:embed/>
-                    <p:pic>
-                      <p:nvPicPr>
-                        <p:cNvPr id="0" name="Picture 6"/>
-                        <p:cNvPicPr>
-                          <a:picLocks noChangeAspect="1" noChangeArrowheads="1"/>
-                        </p:cNvPicPr>
-                        <p:nvPr/>
-                      </p:nvPicPr>
-                      <p:blipFill>
-                        <a:blip r:embed="rId10">
-                          <a:extLst>
-                            <a:ext uri="{28A0092B-C50C-407E-A947-70E740481C1C}">
-                              <a14:useLocalDpi xmlns:a14="http://schemas.microsoft.com/office/drawing/2010/main" val="0"/>
-                            </a:ext>
-                          </a:extLst>
-                        </a:blip>
-                        <a:srcRect/>
-                        <a:stretch>
-                          <a:fillRect/>
-                        </a:stretch>
-                      </p:blipFill>
-                      <p:spPr bwMode="auto">
-                        <a:xfrm>
-                          <a:off x="2064" y="1585"/>
-                          <a:ext cx="96" cy="152"/>
-                        </a:xfrm>
-                        <a:prstGeom prst="rect">
-                          <a:avLst/>
-                        </a:prstGeom>
-                        <a:noFill/>
-                        <a:extLst>
-                          <a:ext uri="{909E8E84-426E-40dd-AFC4-6F175D3DCCD1}">
-                            <a14:hiddenFill xmlns:a14="http://schemas.microsoft.com/office/drawing/2010/main">
-                              <a:solidFill>
-                                <a:srgbClr val="FFFFFF"/>
-                              </a:solidFill>
-                            </a14:hiddenFill>
-                          </a:ext>
-                        </a:extLst>
-                      </p:spPr>
-                    </p:pic>
-                  </p:oleObj>
-                </mc:Fallback>
-              </mc:AlternateContent>
+              <p:oleObj spid="_x0000_s1095" name="Equation" r:id="rId5" imgW="152124" imgH="241415" progId="Equation.DSMT4">
+                <p:embed/>
+              </p:oleObj>
             </a:graphicData>
           </a:graphic>
         </p:graphicFrame>
@@ -3870,59 +3649,9 @@
           </p:xfrm>
           <a:graphic>
             <a:graphicData uri="http://schemas.openxmlformats.org/presentationml/2006/ole">
-              <mc:AlternateContent xmlns:mc="http://schemas.openxmlformats.org/markup-compatibility/2006">
-                <mc:Choice xmlns:v="urn:schemas-microsoft-com:vml" Requires="v">
-                  <p:oleObj spid="_x0000_s1096" name="Equation" r:id="rId11" imgW="177480" imgH="266400" progId="Equation.DSMT4">
-                    <p:embed/>
-                  </p:oleObj>
-                </mc:Choice>
-                <mc:Fallback>
-                  <p:oleObj name="Equation" r:id="rId11" imgW="177480" imgH="266400" progId="Equation.DSMT4">
-                    <p:embed/>
-                    <p:pic>
-                      <p:nvPicPr>
-                        <p:cNvPr id="0" name="Picture 7"/>
-                        <p:cNvPicPr>
-                          <a:picLocks noChangeAspect="1" noChangeArrowheads="1"/>
-                        </p:cNvPicPr>
-                        <p:nvPr/>
-                      </p:nvPicPr>
-                      <p:blipFill>
-                        <a:blip r:embed="rId12">
-                          <a:extLst>
-                            <a:ext uri="{28A0092B-C50C-407E-A947-70E740481C1C}">
-                              <a14:useLocalDpi xmlns:a14="http://schemas.microsoft.com/office/drawing/2010/main" val="0"/>
-                            </a:ext>
-                          </a:extLst>
-                        </a:blip>
-                        <a:srcRect/>
-                        <a:stretch>
-                          <a:fillRect/>
-                        </a:stretch>
-                      </p:blipFill>
-                      <p:spPr bwMode="auto">
-                        <a:xfrm>
-                          <a:off x="1024" y="1347"/>
-                          <a:ext cx="112" cy="168"/>
-                        </a:xfrm>
-                        <a:prstGeom prst="rect">
-                          <a:avLst/>
-                        </a:prstGeom>
-                        <a:noFill/>
-                        <a:extLst>
-                          <a:ext uri="{909E8E84-426E-40dd-AFC4-6F175D3DCCD1}">
-                            <a14:hiddenFill xmlns:a14="http://schemas.microsoft.com/office/drawing/2010/main">
-                              <a:solidFill>
-                                <a:srgbClr val="FFFFFF"/>
-                              </a:solidFill>
-                            </a14:hiddenFill>
-                          </a:ext>
-                        </a:extLst>
-                      </p:spPr>
-                    </p:pic>
-                  </p:oleObj>
-                </mc:Fallback>
-              </mc:AlternateContent>
+              <p:oleObj spid="_x0000_s1096" name="Equation" r:id="rId6" imgW="177708" imgH="266287" progId="Equation.DSMT4">
+                <p:embed/>
+              </p:oleObj>
             </a:graphicData>
           </a:graphic>
         </p:graphicFrame>
@@ -3940,59 +3669,9 @@
           </p:xfrm>
           <a:graphic>
             <a:graphicData uri="http://schemas.openxmlformats.org/presentationml/2006/ole">
-              <mc:AlternateContent xmlns:mc="http://schemas.openxmlformats.org/markup-compatibility/2006">
-                <mc:Choice xmlns:v="urn:schemas-microsoft-com:vml" Requires="v">
-                  <p:oleObj spid="_x0000_s1097" name="Equation" r:id="rId13" imgW="126720" imgH="139680" progId="Equation.DSMT4">
-                    <p:embed/>
-                  </p:oleObj>
-                </mc:Choice>
-                <mc:Fallback>
-                  <p:oleObj name="Equation" r:id="rId13" imgW="126720" imgH="139680" progId="Equation.DSMT4">
-                    <p:embed/>
-                    <p:pic>
-                      <p:nvPicPr>
-                        <p:cNvPr id="0" name="Picture 8"/>
-                        <p:cNvPicPr>
-                          <a:picLocks noChangeAspect="1" noChangeArrowheads="1"/>
-                        </p:cNvPicPr>
-                        <p:nvPr/>
-                      </p:nvPicPr>
-                      <p:blipFill>
-                        <a:blip r:embed="rId14">
-                          <a:extLst>
-                            <a:ext uri="{28A0092B-C50C-407E-A947-70E740481C1C}">
-                              <a14:useLocalDpi xmlns:a14="http://schemas.microsoft.com/office/drawing/2010/main" val="0"/>
-                            </a:ext>
-                          </a:extLst>
-                        </a:blip>
-                        <a:srcRect/>
-                        <a:stretch>
-                          <a:fillRect/>
-                        </a:stretch>
-                      </p:blipFill>
-                      <p:spPr bwMode="auto">
-                        <a:xfrm>
-                          <a:off x="1276" y="1288"/>
-                          <a:ext cx="80" cy="88"/>
-                        </a:xfrm>
-                        <a:prstGeom prst="rect">
-                          <a:avLst/>
-                        </a:prstGeom>
-                        <a:noFill/>
-                        <a:extLst>
-                          <a:ext uri="{909E8E84-426E-40dd-AFC4-6F175D3DCCD1}">
-                            <a14:hiddenFill xmlns:a14="http://schemas.microsoft.com/office/drawing/2010/main">
-                              <a:solidFill>
-                                <a:srgbClr val="FFFFFF"/>
-                              </a:solidFill>
-                            </a14:hiddenFill>
-                          </a:ext>
-                        </a:extLst>
-                      </p:spPr>
-                    </p:pic>
-                  </p:oleObj>
-                </mc:Fallback>
-              </mc:AlternateContent>
+              <p:oleObj spid="_x0000_s1097" name="Equation" r:id="rId7" imgW="126847" imgH="139531" progId="Equation.DSMT4">
+                <p:embed/>
+              </p:oleObj>
             </a:graphicData>
           </a:graphic>
         </p:graphicFrame>
@@ -4010,59 +3689,9 @@
           </p:xfrm>
           <a:graphic>
             <a:graphicData uri="http://schemas.openxmlformats.org/presentationml/2006/ole">
-              <mc:AlternateContent xmlns:mc="http://schemas.openxmlformats.org/markup-compatibility/2006">
-                <mc:Choice xmlns:v="urn:schemas-microsoft-com:vml" Requires="v">
-                  <p:oleObj spid="_x0000_s1098" name="Equation" r:id="rId15" imgW="177480" imgH="228600" progId="Equation.DSMT4">
-                    <p:embed/>
-                  </p:oleObj>
-                </mc:Choice>
-                <mc:Fallback>
-                  <p:oleObj name="Equation" r:id="rId15" imgW="177480" imgH="228600" progId="Equation.DSMT4">
-                    <p:embed/>
-                    <p:pic>
-                      <p:nvPicPr>
-                        <p:cNvPr id="0" name="Picture 9"/>
-                        <p:cNvPicPr>
-                          <a:picLocks noChangeAspect="1" noChangeArrowheads="1"/>
-                        </p:cNvPicPr>
-                        <p:nvPr/>
-                      </p:nvPicPr>
-                      <p:blipFill>
-                        <a:blip r:embed="rId16">
-                          <a:extLst>
-                            <a:ext uri="{28A0092B-C50C-407E-A947-70E740481C1C}">
-                              <a14:useLocalDpi xmlns:a14="http://schemas.microsoft.com/office/drawing/2010/main" val="0"/>
-                            </a:ext>
-                          </a:extLst>
-                        </a:blip>
-                        <a:srcRect/>
-                        <a:stretch>
-                          <a:fillRect/>
-                        </a:stretch>
-                      </p:blipFill>
-                      <p:spPr bwMode="auto">
-                        <a:xfrm>
-                          <a:off x="1911" y="1380"/>
-                          <a:ext cx="112" cy="144"/>
-                        </a:xfrm>
-                        <a:prstGeom prst="rect">
-                          <a:avLst/>
-                        </a:prstGeom>
-                        <a:noFill/>
-                        <a:extLst>
-                          <a:ext uri="{909E8E84-426E-40dd-AFC4-6F175D3DCCD1}">
-                            <a14:hiddenFill xmlns:a14="http://schemas.microsoft.com/office/drawing/2010/main">
-                              <a:solidFill>
-                                <a:srgbClr val="FFFFFF"/>
-                              </a:solidFill>
-                            </a14:hiddenFill>
-                          </a:ext>
-                        </a:extLst>
-                      </p:spPr>
-                    </p:pic>
-                  </p:oleObj>
-                </mc:Fallback>
-              </mc:AlternateContent>
+              <p:oleObj spid="_x0000_s1098" name="Equation" r:id="rId8" imgW="177708" imgH="228325" progId="Equation.DSMT4">
+                <p:embed/>
+              </p:oleObj>
             </a:graphicData>
           </a:graphic>
         </p:graphicFrame>
@@ -4080,59 +3709,9 @@
           </p:xfrm>
           <a:graphic>
             <a:graphicData uri="http://schemas.openxmlformats.org/presentationml/2006/ole">
-              <mc:AlternateContent xmlns:mc="http://schemas.openxmlformats.org/markup-compatibility/2006">
-                <mc:Choice xmlns:v="urn:schemas-microsoft-com:vml" Requires="v">
-                  <p:oleObj spid="_x0000_s1099" name="Equation" r:id="rId17" imgW="190440" imgH="228600" progId="Equation.DSMT4">
-                    <p:embed/>
-                  </p:oleObj>
-                </mc:Choice>
-                <mc:Fallback>
-                  <p:oleObj name="Equation" r:id="rId17" imgW="190440" imgH="228600" progId="Equation.DSMT4">
-                    <p:embed/>
-                    <p:pic>
-                      <p:nvPicPr>
-                        <p:cNvPr id="0" name="Picture 10"/>
-                        <p:cNvPicPr>
-                          <a:picLocks noChangeAspect="1" noChangeArrowheads="1"/>
-                        </p:cNvPicPr>
-                        <p:nvPr/>
-                      </p:nvPicPr>
-                      <p:blipFill>
-                        <a:blip r:embed="rId18">
-                          <a:extLst>
-                            <a:ext uri="{28A0092B-C50C-407E-A947-70E740481C1C}">
-                              <a14:useLocalDpi xmlns:a14="http://schemas.microsoft.com/office/drawing/2010/main" val="0"/>
-                            </a:ext>
-                          </a:extLst>
-                        </a:blip>
-                        <a:srcRect/>
-                        <a:stretch>
-                          <a:fillRect/>
-                        </a:stretch>
-                      </p:blipFill>
-                      <p:spPr bwMode="auto">
-                        <a:xfrm>
-                          <a:off x="1305" y="863"/>
-                          <a:ext cx="120" cy="144"/>
-                        </a:xfrm>
-                        <a:prstGeom prst="rect">
-                          <a:avLst/>
-                        </a:prstGeom>
-                        <a:noFill/>
-                        <a:extLst>
-                          <a:ext uri="{909E8E84-426E-40dd-AFC4-6F175D3DCCD1}">
-                            <a14:hiddenFill xmlns:a14="http://schemas.microsoft.com/office/drawing/2010/main">
-                              <a:solidFill>
-                                <a:srgbClr val="FFFFFF"/>
-                              </a:solidFill>
-                            </a14:hiddenFill>
-                          </a:ext>
-                        </a:extLst>
-                      </p:spPr>
-                    </p:pic>
-                  </p:oleObj>
-                </mc:Fallback>
-              </mc:AlternateContent>
+              <p:oleObj spid="_x0000_s1099" name="Equation" r:id="rId9" imgW="190477" imgH="228462" progId="Equation.DSMT4">
+                <p:embed/>
+              </p:oleObj>
             </a:graphicData>
           </a:graphic>
         </p:graphicFrame>
@@ -4150,59 +3729,9 @@
           </p:xfrm>
           <a:graphic>
             <a:graphicData uri="http://schemas.openxmlformats.org/presentationml/2006/ole">
-              <mc:AlternateContent xmlns:mc="http://schemas.openxmlformats.org/markup-compatibility/2006">
-                <mc:Choice xmlns:v="urn:schemas-microsoft-com:vml" Requires="v">
-                  <p:oleObj spid="_x0000_s1100" name="Equation" r:id="rId19" imgW="152280" imgH="164880" progId="Equation.DSMT4">
-                    <p:embed/>
-                  </p:oleObj>
-                </mc:Choice>
-                <mc:Fallback>
-                  <p:oleObj name="Equation" r:id="rId19" imgW="152280" imgH="164880" progId="Equation.DSMT4">
-                    <p:embed/>
-                    <p:pic>
-                      <p:nvPicPr>
-                        <p:cNvPr id="0" name="Picture 11"/>
-                        <p:cNvPicPr>
-                          <a:picLocks noChangeAspect="1" noChangeArrowheads="1"/>
-                        </p:cNvPicPr>
-                        <p:nvPr/>
-                      </p:nvPicPr>
-                      <p:blipFill>
-                        <a:blip r:embed="rId20">
-                          <a:extLst>
-                            <a:ext uri="{28A0092B-C50C-407E-A947-70E740481C1C}">
-                              <a14:useLocalDpi xmlns:a14="http://schemas.microsoft.com/office/drawing/2010/main" val="0"/>
-                            </a:ext>
-                          </a:extLst>
-                        </a:blip>
-                        <a:srcRect/>
-                        <a:stretch>
-                          <a:fillRect/>
-                        </a:stretch>
-                      </p:blipFill>
-                      <p:spPr bwMode="auto">
-                        <a:xfrm>
-                          <a:off x="743" y="612"/>
-                          <a:ext cx="96" cy="104"/>
-                        </a:xfrm>
-                        <a:prstGeom prst="rect">
-                          <a:avLst/>
-                        </a:prstGeom>
-                        <a:noFill/>
-                        <a:extLst>
-                          <a:ext uri="{909E8E84-426E-40dd-AFC4-6F175D3DCCD1}">
-                            <a14:hiddenFill xmlns:a14="http://schemas.microsoft.com/office/drawing/2010/main">
-                              <a:solidFill>
-                                <a:srgbClr val="FFFFFF"/>
-                              </a:solidFill>
-                            </a14:hiddenFill>
-                          </a:ext>
-                        </a:extLst>
-                      </p:spPr>
-                    </p:pic>
-                  </p:oleObj>
-                </mc:Fallback>
-              </mc:AlternateContent>
+              <p:oleObj spid="_x0000_s1100" name="Equation" r:id="rId10" imgW="152216" imgH="164901" progId="Equation.DSMT4">
+                <p:embed/>
+              </p:oleObj>
             </a:graphicData>
           </a:graphic>
         </p:graphicFrame>
@@ -4220,59 +3749,9 @@
           </p:xfrm>
           <a:graphic>
             <a:graphicData uri="http://schemas.openxmlformats.org/presentationml/2006/ole">
-              <mc:AlternateContent xmlns:mc="http://schemas.openxmlformats.org/markup-compatibility/2006">
-                <mc:Choice xmlns:v="urn:schemas-microsoft-com:vml" Requires="v">
-                  <p:oleObj spid="_x0000_s1101" name="Equation" r:id="rId21" imgW="126720" imgH="164880" progId="Equation.DSMT4">
-                    <p:embed/>
-                  </p:oleObj>
-                </mc:Choice>
-                <mc:Fallback>
-                  <p:oleObj name="Equation" r:id="rId21" imgW="126720" imgH="164880" progId="Equation.DSMT4">
-                    <p:embed/>
-                    <p:pic>
-                      <p:nvPicPr>
-                        <p:cNvPr id="0" name="Picture 12"/>
-                        <p:cNvPicPr>
-                          <a:picLocks noChangeAspect="1" noChangeArrowheads="1"/>
-                        </p:cNvPicPr>
-                        <p:nvPr/>
-                      </p:nvPicPr>
-                      <p:blipFill>
-                        <a:blip r:embed="rId22">
-                          <a:extLst>
-                            <a:ext uri="{28A0092B-C50C-407E-A947-70E740481C1C}">
-                              <a14:useLocalDpi xmlns:a14="http://schemas.microsoft.com/office/drawing/2010/main" val="0"/>
-                            </a:ext>
-                          </a:extLst>
-                        </a:blip>
-                        <a:srcRect/>
-                        <a:stretch>
-                          <a:fillRect/>
-                        </a:stretch>
-                      </p:blipFill>
-                      <p:spPr bwMode="auto">
-                        <a:xfrm>
-                          <a:off x="1102" y="473"/>
-                          <a:ext cx="80" cy="104"/>
-                        </a:xfrm>
-                        <a:prstGeom prst="rect">
-                          <a:avLst/>
-                        </a:prstGeom>
-                        <a:noFill/>
-                        <a:extLst>
-                          <a:ext uri="{909E8E84-426E-40dd-AFC4-6F175D3DCCD1}">
-                            <a14:hiddenFill xmlns:a14="http://schemas.microsoft.com/office/drawing/2010/main">
-                              <a:solidFill>
-                                <a:srgbClr val="FFFFFF"/>
-                              </a:solidFill>
-                            </a14:hiddenFill>
-                          </a:ext>
-                        </a:extLst>
-                      </p:spPr>
-                    </p:pic>
-                  </p:oleObj>
-                </mc:Fallback>
-              </mc:AlternateContent>
+              <p:oleObj spid="_x0000_s1101" name="Equation" r:id="rId11" imgW="126770" imgH="164801" progId="Equation.DSMT4">
+                <p:embed/>
+              </p:oleObj>
             </a:graphicData>
           </a:graphic>
         </p:graphicFrame>
@@ -4290,59 +3769,9 @@
           </p:xfrm>
           <a:graphic>
             <a:graphicData uri="http://schemas.openxmlformats.org/presentationml/2006/ole">
-              <mc:AlternateContent xmlns:mc="http://schemas.openxmlformats.org/markup-compatibility/2006">
-                <mc:Choice xmlns:v="urn:schemas-microsoft-com:vml" Requires="v">
-                  <p:oleObj spid="_x0000_s1102" name="Equation" r:id="rId23" imgW="139680" imgH="177480" progId="Equation.DSMT4">
-                    <p:embed/>
-                  </p:oleObj>
-                </mc:Choice>
-                <mc:Fallback>
-                  <p:oleObj name="Equation" r:id="rId23" imgW="139680" imgH="177480" progId="Equation.DSMT4">
-                    <p:embed/>
-                    <p:pic>
-                      <p:nvPicPr>
-                        <p:cNvPr id="0" name="Picture 13"/>
-                        <p:cNvPicPr>
-                          <a:picLocks noChangeAspect="1" noChangeArrowheads="1"/>
-                        </p:cNvPicPr>
-                        <p:nvPr/>
-                      </p:nvPicPr>
-                      <p:blipFill>
-                        <a:blip r:embed="rId24">
-                          <a:extLst>
-                            <a:ext uri="{28A0092B-C50C-407E-A947-70E740481C1C}">
-                              <a14:useLocalDpi xmlns:a14="http://schemas.microsoft.com/office/drawing/2010/main" val="0"/>
-                            </a:ext>
-                          </a:extLst>
-                        </a:blip>
-                        <a:srcRect/>
-                        <a:stretch>
-                          <a:fillRect/>
-                        </a:stretch>
-                      </p:blipFill>
-                      <p:spPr bwMode="auto">
-                        <a:xfrm>
-                          <a:off x="1052" y="971"/>
-                          <a:ext cx="88" cy="112"/>
-                        </a:xfrm>
-                        <a:prstGeom prst="rect">
-                          <a:avLst/>
-                        </a:prstGeom>
-                        <a:noFill/>
-                        <a:extLst>
-                          <a:ext uri="{909E8E84-426E-40dd-AFC4-6F175D3DCCD1}">
-                            <a14:hiddenFill xmlns:a14="http://schemas.microsoft.com/office/drawing/2010/main">
-                              <a:solidFill>
-                                <a:srgbClr val="FFFFFF"/>
-                              </a:solidFill>
-                            </a14:hiddenFill>
-                          </a:ext>
-                        </a:extLst>
-                      </p:spPr>
-                    </p:pic>
-                  </p:oleObj>
-                </mc:Fallback>
-              </mc:AlternateContent>
+              <p:oleObj spid="_x0000_s1102" name="Equation" r:id="rId12" imgW="139279" imgH="177815" progId="Equation.DSMT4">
+                <p:embed/>
+              </p:oleObj>
             </a:graphicData>
           </a:graphic>
         </p:graphicFrame>
@@ -5151,84 +4580,9 @@
           </p:xfrm>
           <a:graphic>
             <a:graphicData uri="http://schemas.openxmlformats.org/presentationml/2006/ole">
-              <mc:AlternateContent xmlns:mc="http://schemas.openxmlformats.org/markup-compatibility/2006">
-                <mc:Choice xmlns:v="urn:schemas-microsoft-com:vml" Requires="v">
-                  <p:oleObj spid="_x0000_s1103" name="Equation" r:id="rId25" imgW="380880" imgH="164880" progId="Equation.DSMT4">
-                    <p:embed/>
-                  </p:oleObj>
-                </mc:Choice>
-                <mc:Fallback>
-                  <p:oleObj name="Equation" r:id="rId25" imgW="380880" imgH="164880" progId="Equation.DSMT4">
-                    <p:embed/>
-                    <p:pic>
-                      <p:nvPicPr>
-                        <p:cNvPr id="0" name="Picture 14"/>
-                        <p:cNvPicPr>
-                          <a:picLocks noChangeAspect="1" noChangeArrowheads="1"/>
-                        </p:cNvPicPr>
-                        <p:nvPr/>
-                      </p:nvPicPr>
-                      <p:blipFill>
-                        <a:blip r:embed="rId26">
-                          <a:extLst>
-                            <a:ext uri="{28A0092B-C50C-407E-A947-70E740481C1C}">
-                              <a14:useLocalDpi xmlns:a14="http://schemas.microsoft.com/office/drawing/2010/main" val="0"/>
-                            </a:ext>
-                          </a:extLst>
-                        </a:blip>
-                        <a:srcRect/>
-                        <a:stretch>
-                          <a:fillRect/>
-                        </a:stretch>
-                      </p:blipFill>
-                      <p:spPr bwMode="auto">
-                        <a:xfrm>
-                          <a:off x="1775" y="1082"/>
-                          <a:ext cx="206" cy="89"/>
-                        </a:xfrm>
-                        <a:prstGeom prst="rect">
-                          <a:avLst/>
-                        </a:prstGeom>
-                        <a:noFill/>
-                        <a:ln>
-                          <a:noFill/>
-                        </a:ln>
-                        <a:effectLst/>
-                        <a:extLst>
-                          <a:ext uri="{909E8E84-426E-40dd-AFC4-6F175D3DCCD1}">
-                            <a14:hiddenFill xmlns:a14="http://schemas.microsoft.com/office/drawing/2010/main">
-                              <a:solidFill>
-                                <a:schemeClr val="accent1"/>
-                              </a:solidFill>
-                            </a14:hiddenFill>
-                          </a:ext>
-                          <a:ext uri="{91240B29-F687-4f45-9708-019B960494DF}">
-                            <a14:hiddenLine xmlns:a14="http://schemas.microsoft.com/office/drawing/2010/main" w="9525">
-                              <a:solidFill>
-                                <a:schemeClr val="tx1"/>
-                              </a:solidFill>
-                              <a:miter lim="800000"/>
-                              <a:headEnd/>
-                              <a:tailEnd/>
-                            </a14:hiddenLine>
-                          </a:ext>
-                          <a:ext uri="{AF507438-7753-43e0-B8FC-AC1667EBCBE1}">
-                            <a14:hiddenEffects xmlns:a14="http://schemas.microsoft.com/office/drawing/2010/main">
-                              <a:effectLst>
-                                <a:outerShdw blurRad="63500" dist="38099" dir="2700000" algn="ctr" rotWithShape="0">
-                                  <a:schemeClr val="bg2">
-                                    <a:alpha val="74998"/>
-                                  </a:schemeClr>
-                                </a:outerShdw>
-                              </a:effectLst>
-                            </a14:hiddenEffects>
-                          </a:ext>
-                        </a:extLst>
-                      </p:spPr>
-                    </p:pic>
-                  </p:oleObj>
-                </mc:Fallback>
-              </mc:AlternateContent>
+              <p:oleObj spid="_x0000_s1103" name="Equation" r:id="rId13" imgW="380862" imgH="164801" progId="Equation.DSMT4">
+                <p:embed/>
+              </p:oleObj>
             </a:graphicData>
           </a:graphic>
         </p:graphicFrame>
@@ -5354,111 +4708,6 @@
           </p:txBody>
         </p:sp>
       </p:grpSp>
-      <p:graphicFrame>
-        <p:nvGraphicFramePr>
-          <p:cNvPr id="25657" name="Object 57"/>
-          <p:cNvGraphicFramePr>
-            <a:graphicFrameLocks noChangeAspect="1"/>
-          </p:cNvGraphicFramePr>
-          <p:nvPr/>
-        </p:nvGraphicFramePr>
-        <p:xfrm>
-          <a:off x="865188" y="3341688"/>
-          <a:ext cx="3001962" cy="2887662"/>
-        </p:xfrm>
-        <a:graphic>
-          <a:graphicData uri="http://schemas.openxmlformats.org/presentationml/2006/ole">
-            <mc:AlternateContent xmlns:mc="http://schemas.openxmlformats.org/markup-compatibility/2006">
-              <mc:Choice xmlns:v="urn:schemas-microsoft-com:vml" Requires="v">
-                <p:oleObj spid="_x0000_s1104" name="Photo Editor Photo" r:id="rId27" imgW="5570703" imgH="5357324" progId="MSPhotoEd.3">
-                  <p:embed/>
-                </p:oleObj>
-              </mc:Choice>
-              <mc:Fallback>
-                <p:oleObj name="Photo Editor Photo" r:id="rId27" imgW="5570703" imgH="5357324" progId="MSPhotoEd.3">
-                  <p:embed/>
-                  <p:pic>
-                    <p:nvPicPr>
-                      <p:cNvPr id="0" name="Picture 3"/>
-                      <p:cNvPicPr>
-                        <a:picLocks noChangeAspect="1" noChangeArrowheads="1"/>
-                      </p:cNvPicPr>
-                      <p:nvPr/>
-                    </p:nvPicPr>
-                    <p:blipFill>
-                      <a:blip r:embed="rId28">
-                        <a:clrChange>
-                          <a:clrFrom>
-                            <a:srgbClr val="FFFFFF"/>
-                          </a:clrFrom>
-                          <a:clrTo>
-                            <a:srgbClr val="FFFFFF">
-                              <a:alpha val="0"/>
-                            </a:srgbClr>
-                          </a:clrTo>
-                        </a:clrChange>
-                        <a:extLst>
-                          <a:ext uri="{28A0092B-C50C-407E-A947-70E740481C1C}">
-                            <a14:useLocalDpi xmlns:a14="http://schemas.microsoft.com/office/drawing/2010/main" val="0"/>
-                          </a:ext>
-                        </a:extLst>
-                      </a:blip>
-                      <a:srcRect/>
-                      <a:stretch>
-                        <a:fillRect/>
-                      </a:stretch>
-                    </p:blipFill>
-                    <p:spPr bwMode="auto">
-                      <a:xfrm>
-                        <a:off x="865188" y="3341688"/>
-                        <a:ext cx="3001962" cy="2887662"/>
-                      </a:xfrm>
-                      <a:prstGeom prst="rect">
-                        <a:avLst/>
-                      </a:prstGeom>
-                      <a:noFill/>
-                      <a:ln>
-                        <a:noFill/>
-                      </a:ln>
-                      <a:effectLst/>
-                      <a:extLst>
-                        <a:ext uri="{909E8E84-426E-40dd-AFC4-6F175D3DCCD1}">
-                          <a14:hiddenFill xmlns:a14="http://schemas.microsoft.com/office/drawing/2010/main">
-                            <a:solidFill>
-                              <a:schemeClr val="accent1"/>
-                            </a:solidFill>
-                          </a14:hiddenFill>
-                        </a:ext>
-                        <a:ext uri="{91240B29-F687-4f45-9708-019B960494DF}">
-                          <a14:hiddenLine xmlns:a14="http://schemas.microsoft.com/office/drawing/2010/main" w="9525">
-                            <a:solidFill>
-                              <a:schemeClr val="tx1"/>
-                            </a:solidFill>
-                            <a:miter lim="800000"/>
-                            <a:headEnd/>
-                            <a:tailEnd/>
-                          </a14:hiddenLine>
-                        </a:ext>
-                        <a:ext uri="{AF507438-7753-43e0-B8FC-AC1667EBCBE1}">
-                          <a14:hiddenEffects xmlns:a14="http://schemas.microsoft.com/office/drawing/2010/main">
-                            <a:effectLst>
-                              <a:outerShdw blurRad="63500" dist="38099" dir="2700000" algn="ctr" rotWithShape="0">
-                                <a:schemeClr val="bg2">
-                                  <a:alpha val="74998"/>
-                                </a:schemeClr>
-                              </a:outerShdw>
-                            </a:effectLst>
-                          </a14:hiddenEffects>
-                        </a:ext>
-                      </a:extLst>
-                    </p:spPr>
-                  </p:pic>
-                </p:oleObj>
-              </mc:Fallback>
-            </mc:AlternateContent>
-          </a:graphicData>
-        </a:graphic>
-      </p:graphicFrame>
     </p:spTree>
   </p:cSld>
   <p:clrMapOvr>
@@ -5467,7 +4716,7 @@
   <p:timing>
     <p:tnLst>
       <p:par>
-        <p:cTn xmlns:p14="http://schemas.microsoft.com/office/powerpoint/2010/main" id="1" dur="indefinite" restart="never" nodeType="tmRoot"/>
+        <p:cTn id="1" dur="indefinite" restart="never" nodeType="tmRoot"/>
       </p:par>
     </p:tnLst>
   </p:timing>
@@ -5500,7 +4749,7 @@
           <p:nvPr/>
         </p:nvPicPr>
         <p:blipFill>
-          <a:blip r:embed="rId3"/>
+          <a:blip r:embed="rId3" cstate="print"/>
           <a:stretch>
             <a:fillRect/>
           </a:stretch>
@@ -5739,11 +4988,7 @@
               </a:pPr>
               <a:r>
                 <a:rPr lang="en-US" sz="1000" b="1" dirty="0" smtClean="0"/>
-                <a:t>t</a:t>
-              </a:r>
-              <a:r>
-                <a:rPr lang="en-US" sz="1000" b="1" dirty="0" smtClean="0"/>
-                <a:t>hermal</a:t>
+                <a:t>thermal</a:t>
               </a:r>
               <a:endParaRPr lang="en-US" sz="1000" b="1" dirty="0"/>
             </a:p>
@@ -5888,7 +5133,7 @@
             <p:nvPr>
               <p:extLst>
                 <p:ext uri="{D42A27DB-BD31-4B8C-83A1-F6EECF244321}">
-                  <p14:modId xmlns:p14="http://schemas.microsoft.com/office/powerpoint/2010/main" val="432575041"/>
+                  <p14:modId xmlns:p14="http://schemas.microsoft.com/office/powerpoint/2010/main" xmlns="" val="432575041"/>
                 </p:ext>
               </p:extLst>
             </p:nvPr>
@@ -5899,44 +5144,9 @@
           </p:xfrm>
           <a:graphic>
             <a:graphicData uri="http://schemas.openxmlformats.org/presentationml/2006/ole">
-              <mc:AlternateContent xmlns:mc="http://schemas.openxmlformats.org/markup-compatibility/2006">
-                <mc:Choice xmlns:v="urn:schemas-microsoft-com:vml" Requires="v">
-                  <p:oleObj spid="_x0000_s2076" name="Equation" r:id="rId4" imgW="190500" imgH="266700" progId="Equation.3">
-                    <p:embed/>
-                  </p:oleObj>
-                </mc:Choice>
-                <mc:Fallback>
-                  <p:oleObj name="Equation" r:id="rId4" imgW="190500" imgH="266700" progId="Equation.3">
-                    <p:embed/>
-                    <p:pic>
-                      <p:nvPicPr>
-                        <p:cNvPr id="0" name=""/>
-                        <p:cNvPicPr>
-                          <a:picLocks noChangeAspect="1" noChangeArrowheads="1"/>
-                        </p:cNvPicPr>
-                        <p:nvPr/>
-                      </p:nvPicPr>
-                      <p:blipFill>
-                        <a:blip r:embed="rId5"/>
-                        <a:srcRect/>
-                        <a:stretch>
-                          <a:fillRect/>
-                        </a:stretch>
-                      </p:blipFill>
-                      <p:spPr bwMode="auto">
-                        <a:xfrm>
-                          <a:off x="1138" y="179"/>
-                          <a:ext cx="120" cy="168"/>
-                        </a:xfrm>
-                        <a:prstGeom prst="rect">
-                          <a:avLst/>
-                        </a:prstGeom>
-                        <a:noFill/>
-                      </p:spPr>
-                    </p:pic>
-                  </p:oleObj>
-                </mc:Fallback>
-              </mc:AlternateContent>
+              <p:oleObj spid="_x0000_s2076" name="Equation" r:id="rId4" imgW="182520" imgH="255960" progId="Equation.3">
+                <p:embed/>
+              </p:oleObj>
             </a:graphicData>
           </a:graphic>
         </p:graphicFrame>
@@ -5949,7 +5159,7 @@
             <p:nvPr>
               <p:extLst>
                 <p:ext uri="{D42A27DB-BD31-4B8C-83A1-F6EECF244321}">
-                  <p14:modId xmlns:p14="http://schemas.microsoft.com/office/powerpoint/2010/main" val="2225287420"/>
+                  <p14:modId xmlns:p14="http://schemas.microsoft.com/office/powerpoint/2010/main" xmlns="" val="2225287420"/>
                 </p:ext>
               </p:extLst>
             </p:nvPr>
@@ -5960,53 +5170,9 @@
           </p:xfrm>
           <a:graphic>
             <a:graphicData uri="http://schemas.openxmlformats.org/presentationml/2006/ole">
-              <mc:AlternateContent xmlns:mc="http://schemas.openxmlformats.org/markup-compatibility/2006">
-                <mc:Choice xmlns:v="urn:schemas-microsoft-com:vml" Requires="v">
-                  <p:oleObj spid="_x0000_s2077" name="Equation" r:id="rId6" imgW="177800" imgH="266700" progId="Equation.3">
-                    <p:embed/>
-                  </p:oleObj>
-                </mc:Choice>
-                <mc:Fallback>
-                  <p:oleObj name="Equation" r:id="rId6" imgW="177800" imgH="266700" progId="Equation.3">
-                    <p:embed/>
-                    <p:pic>
-                      <p:nvPicPr>
-                        <p:cNvPr id="0" name=""/>
-                        <p:cNvPicPr>
-                          <a:picLocks noChangeAspect="1" noChangeArrowheads="1"/>
-                        </p:cNvPicPr>
-                        <p:nvPr/>
-                      </p:nvPicPr>
-                      <p:blipFill>
-                        <a:blip r:embed="rId7"/>
-                        <a:srcRect/>
-                        <a:stretch>
-                          <a:fillRect/>
-                        </a:stretch>
-                      </p:blipFill>
-                      <p:spPr bwMode="auto">
-                        <a:xfrm>
-                          <a:off x="1354" y="487"/>
-                          <a:ext cx="112" cy="168"/>
-                        </a:xfrm>
-                        <a:prstGeom prst="rect">
-                          <a:avLst/>
-                        </a:prstGeom>
-                        <a:noFill/>
-                        <a:extLst>
-                          <a:ext uri="{909E8E84-426E-40dd-AFC4-6F175D3DCCD1}">
-                            <a14:hiddenFill xmlns:a14="http://schemas.microsoft.com/office/drawing/2010/main">
-                              <a:solidFill>
-                                <a:srgbClr val="FFFFFF"/>
-                              </a:solidFill>
-                            </a14:hiddenFill>
-                          </a:ext>
-                        </a:extLst>
-                      </p:spPr>
-                    </p:pic>
-                  </p:oleObj>
-                </mc:Fallback>
-              </mc:AlternateContent>
+              <p:oleObj spid="_x0000_s2077" name="Equation" r:id="rId5" imgW="164520" imgH="255960" progId="Equation.3">
+                <p:embed/>
+              </p:oleObj>
             </a:graphicData>
           </a:graphic>
         </p:graphicFrame>
@@ -6019,7 +5185,7 @@
             <p:nvPr>
               <p:extLst>
                 <p:ext uri="{D42A27DB-BD31-4B8C-83A1-F6EECF244321}">
-                  <p14:modId xmlns:p14="http://schemas.microsoft.com/office/powerpoint/2010/main" val="168765913"/>
+                  <p14:modId xmlns:p14="http://schemas.microsoft.com/office/powerpoint/2010/main" xmlns="" val="168765913"/>
                 </p:ext>
               </p:extLst>
             </p:nvPr>
@@ -6030,53 +5196,9 @@
           </p:xfrm>
           <a:graphic>
             <a:graphicData uri="http://schemas.openxmlformats.org/presentationml/2006/ole">
-              <mc:AlternateContent xmlns:mc="http://schemas.openxmlformats.org/markup-compatibility/2006">
-                <mc:Choice xmlns:v="urn:schemas-microsoft-com:vml" Requires="v">
-                  <p:oleObj spid="_x0000_s2078" name="Equation" r:id="rId8" imgW="190500" imgH="266700" progId="Equation.3">
-                    <p:embed/>
-                  </p:oleObj>
-                </mc:Choice>
-                <mc:Fallback>
-                  <p:oleObj name="Equation" r:id="rId8" imgW="190500" imgH="266700" progId="Equation.3">
-                    <p:embed/>
-                    <p:pic>
-                      <p:nvPicPr>
-                        <p:cNvPr id="0" name=""/>
-                        <p:cNvPicPr>
-                          <a:picLocks noChangeAspect="1" noChangeArrowheads="1"/>
-                        </p:cNvPicPr>
-                        <p:nvPr/>
-                      </p:nvPicPr>
-                      <p:blipFill>
-                        <a:blip r:embed="rId9"/>
-                        <a:srcRect/>
-                        <a:stretch>
-                          <a:fillRect/>
-                        </a:stretch>
-                      </p:blipFill>
-                      <p:spPr bwMode="auto">
-                        <a:xfrm>
-                          <a:off x="1020" y="1347"/>
-                          <a:ext cx="120" cy="168"/>
-                        </a:xfrm>
-                        <a:prstGeom prst="rect">
-                          <a:avLst/>
-                        </a:prstGeom>
-                        <a:noFill/>
-                        <a:extLst>
-                          <a:ext uri="{909E8E84-426E-40dd-AFC4-6F175D3DCCD1}">
-                            <a14:hiddenFill xmlns:a14="http://schemas.microsoft.com/office/drawing/2010/main">
-                              <a:solidFill>
-                                <a:srgbClr val="FFFFFF"/>
-                              </a:solidFill>
-                            </a14:hiddenFill>
-                          </a:ext>
-                        </a:extLst>
-                      </p:spPr>
-                    </p:pic>
-                  </p:oleObj>
-                </mc:Fallback>
-              </mc:AlternateContent>
+              <p:oleObj spid="_x0000_s2078" name="Equation" r:id="rId6" imgW="182520" imgH="255960" progId="Equation.3">
+                <p:embed/>
+              </p:oleObj>
             </a:graphicData>
           </a:graphic>
         </p:graphicFrame>
@@ -6094,59 +5216,9 @@
           </p:xfrm>
           <a:graphic>
             <a:graphicData uri="http://schemas.openxmlformats.org/presentationml/2006/ole">
-              <mc:AlternateContent xmlns:mc="http://schemas.openxmlformats.org/markup-compatibility/2006">
-                <mc:Choice xmlns:v="urn:schemas-microsoft-com:vml" Requires="v">
-                  <p:oleObj spid="_x0000_s2079" name="Equation" r:id="rId10" imgW="152280" imgH="164880" progId="Equation.DSMT4">
-                    <p:embed/>
-                  </p:oleObj>
-                </mc:Choice>
-                <mc:Fallback>
-                  <p:oleObj name="Equation" r:id="rId10" imgW="152280" imgH="164880" progId="Equation.DSMT4">
-                    <p:embed/>
-                    <p:pic>
-                      <p:nvPicPr>
-                        <p:cNvPr id="0" name=""/>
-                        <p:cNvPicPr>
-                          <a:picLocks noChangeAspect="1" noChangeArrowheads="1"/>
-                        </p:cNvPicPr>
-                        <p:nvPr/>
-                      </p:nvPicPr>
-                      <p:blipFill>
-                        <a:blip r:embed="rId11">
-                          <a:extLst>
-                            <a:ext uri="{28A0092B-C50C-407E-A947-70E740481C1C}">
-                              <a14:useLocalDpi xmlns:a14="http://schemas.microsoft.com/office/drawing/2010/main" val="0"/>
-                            </a:ext>
-                          </a:extLst>
-                        </a:blip>
-                        <a:srcRect/>
-                        <a:stretch>
-                          <a:fillRect/>
-                        </a:stretch>
-                      </p:blipFill>
-                      <p:spPr bwMode="auto">
-                        <a:xfrm>
-                          <a:off x="743" y="612"/>
-                          <a:ext cx="96" cy="104"/>
-                        </a:xfrm>
-                        <a:prstGeom prst="rect">
-                          <a:avLst/>
-                        </a:prstGeom>
-                        <a:noFill/>
-                        <a:extLst>
-                          <a:ext uri="{909E8E84-426E-40dd-AFC4-6F175D3DCCD1}">
-                            <a14:hiddenFill xmlns:a14="http://schemas.microsoft.com/office/drawing/2010/main">
-                              <a:solidFill>
-                                <a:srgbClr val="FFFFFF"/>
-                              </a:solidFill>
-                            </a14:hiddenFill>
-                          </a:ext>
-                        </a:extLst>
-                      </p:spPr>
-                    </p:pic>
-                  </p:oleObj>
-                </mc:Fallback>
-              </mc:AlternateContent>
+              <p:oleObj spid="_x0000_s2079" name="Equation" r:id="rId7" imgW="152216" imgH="164901" progId="Equation.DSMT4">
+                <p:embed/>
+              </p:oleObj>
             </a:graphicData>
           </a:graphic>
         </p:graphicFrame>
@@ -6164,59 +5236,9 @@
           </p:xfrm>
           <a:graphic>
             <a:graphicData uri="http://schemas.openxmlformats.org/presentationml/2006/ole">
-              <mc:AlternateContent xmlns:mc="http://schemas.openxmlformats.org/markup-compatibility/2006">
-                <mc:Choice xmlns:v="urn:schemas-microsoft-com:vml" Requires="v">
-                  <p:oleObj spid="_x0000_s2080" name="Equation" r:id="rId12" imgW="126720" imgH="164880" progId="Equation.DSMT4">
-                    <p:embed/>
-                  </p:oleObj>
-                </mc:Choice>
-                <mc:Fallback>
-                  <p:oleObj name="Equation" r:id="rId12" imgW="126720" imgH="164880" progId="Equation.DSMT4">
-                    <p:embed/>
-                    <p:pic>
-                      <p:nvPicPr>
-                        <p:cNvPr id="0" name=""/>
-                        <p:cNvPicPr>
-                          <a:picLocks noChangeAspect="1" noChangeArrowheads="1"/>
-                        </p:cNvPicPr>
-                        <p:nvPr/>
-                      </p:nvPicPr>
-                      <p:blipFill>
-                        <a:blip r:embed="rId13">
-                          <a:extLst>
-                            <a:ext uri="{28A0092B-C50C-407E-A947-70E740481C1C}">
-                              <a14:useLocalDpi xmlns:a14="http://schemas.microsoft.com/office/drawing/2010/main" val="0"/>
-                            </a:ext>
-                          </a:extLst>
-                        </a:blip>
-                        <a:srcRect/>
-                        <a:stretch>
-                          <a:fillRect/>
-                        </a:stretch>
-                      </p:blipFill>
-                      <p:spPr bwMode="auto">
-                        <a:xfrm>
-                          <a:off x="1102" y="473"/>
-                          <a:ext cx="80" cy="104"/>
-                        </a:xfrm>
-                        <a:prstGeom prst="rect">
-                          <a:avLst/>
-                        </a:prstGeom>
-                        <a:noFill/>
-                        <a:extLst>
-                          <a:ext uri="{909E8E84-426E-40dd-AFC4-6F175D3DCCD1}">
-                            <a14:hiddenFill xmlns:a14="http://schemas.microsoft.com/office/drawing/2010/main">
-                              <a:solidFill>
-                                <a:srgbClr val="FFFFFF"/>
-                              </a:solidFill>
-                            </a14:hiddenFill>
-                          </a:ext>
-                        </a:extLst>
-                      </p:spPr>
-                    </p:pic>
-                  </p:oleObj>
-                </mc:Fallback>
-              </mc:AlternateContent>
+              <p:oleObj spid="_x0000_s2080" name="Equation" r:id="rId8" imgW="126770" imgH="164801" progId="Equation.DSMT4">
+                <p:embed/>
+              </p:oleObj>
             </a:graphicData>
           </a:graphic>
         </p:graphicFrame>
@@ -6234,59 +5256,9 @@
           </p:xfrm>
           <a:graphic>
             <a:graphicData uri="http://schemas.openxmlformats.org/presentationml/2006/ole">
-              <mc:AlternateContent xmlns:mc="http://schemas.openxmlformats.org/markup-compatibility/2006">
-                <mc:Choice xmlns:v="urn:schemas-microsoft-com:vml" Requires="v">
-                  <p:oleObj spid="_x0000_s2081" name="Equation" r:id="rId14" imgW="139680" imgH="177480" progId="Equation.DSMT4">
-                    <p:embed/>
-                  </p:oleObj>
-                </mc:Choice>
-                <mc:Fallback>
-                  <p:oleObj name="Equation" r:id="rId14" imgW="139680" imgH="177480" progId="Equation.DSMT4">
-                    <p:embed/>
-                    <p:pic>
-                      <p:nvPicPr>
-                        <p:cNvPr id="0" name=""/>
-                        <p:cNvPicPr>
-                          <a:picLocks noChangeAspect="1" noChangeArrowheads="1"/>
-                        </p:cNvPicPr>
-                        <p:nvPr/>
-                      </p:nvPicPr>
-                      <p:blipFill>
-                        <a:blip r:embed="rId15">
-                          <a:extLst>
-                            <a:ext uri="{28A0092B-C50C-407E-A947-70E740481C1C}">
-                              <a14:useLocalDpi xmlns:a14="http://schemas.microsoft.com/office/drawing/2010/main" val="0"/>
-                            </a:ext>
-                          </a:extLst>
-                        </a:blip>
-                        <a:srcRect/>
-                        <a:stretch>
-                          <a:fillRect/>
-                        </a:stretch>
-                      </p:blipFill>
-                      <p:spPr bwMode="auto">
-                        <a:xfrm>
-                          <a:off x="1052" y="971"/>
-                          <a:ext cx="88" cy="112"/>
-                        </a:xfrm>
-                        <a:prstGeom prst="rect">
-                          <a:avLst/>
-                        </a:prstGeom>
-                        <a:noFill/>
-                        <a:extLst>
-                          <a:ext uri="{909E8E84-426E-40dd-AFC4-6F175D3DCCD1}">
-                            <a14:hiddenFill xmlns:a14="http://schemas.microsoft.com/office/drawing/2010/main">
-                              <a:solidFill>
-                                <a:srgbClr val="FFFFFF"/>
-                              </a:solidFill>
-                            </a14:hiddenFill>
-                          </a:ext>
-                        </a:extLst>
-                      </p:spPr>
-                    </p:pic>
-                  </p:oleObj>
-                </mc:Fallback>
-              </mc:AlternateContent>
+              <p:oleObj spid="_x0000_s2081" name="Equation" r:id="rId9" imgW="139279" imgH="177815" progId="Equation.DSMT4">
+                <p:embed/>
+              </p:oleObj>
             </a:graphicData>
           </a:graphic>
         </p:graphicFrame>
@@ -6815,14 +5787,13 @@
               <a:rPr lang="en-US" sz="1000" b="1" i="1" dirty="0"/>
               <a:t>y</a:t>
             </a:r>
-            <a:endParaRPr lang="en-US" sz="1000" b="1" i="1" dirty="0"/>
           </a:p>
         </p:txBody>
       </p:sp>
     </p:spTree>
     <p:extLst>
       <p:ext uri="{BB962C8B-B14F-4D97-AF65-F5344CB8AC3E}">
-        <p14:creationId xmlns:p14="http://schemas.microsoft.com/office/powerpoint/2010/main" val="382432504"/>
+        <p14:creationId xmlns:p14="http://schemas.microsoft.com/office/powerpoint/2010/main" xmlns="" val="382432504"/>
       </p:ext>
     </p:extLst>
   </p:cSld>
@@ -6832,7 +5803,7 @@
   <p:timing>
     <p:tnLst>
       <p:par>
-        <p:cTn xmlns:p14="http://schemas.microsoft.com/office/powerpoint/2010/main" id="1" dur="indefinite" restart="never" nodeType="tmRoot"/>
+        <p:cTn id="1" dur="indefinite" restart="never" nodeType="tmRoot"/>
       </p:par>
     </p:tnLst>
   </p:timing>
@@ -6865,7 +5836,7 @@
           <p:nvPr/>
         </p:nvPicPr>
         <p:blipFill>
-          <a:blip r:embed="rId3"/>
+          <a:blip r:embed="rId3" cstate="print"/>
           <a:stretch>
             <a:fillRect/>
           </a:stretch>
@@ -7108,15 +6079,7 @@
                     <a:srgbClr val="FF0000"/>
                   </a:solidFill>
                 </a:rPr>
-                <a:t>t</a:t>
-              </a:r>
-              <a:r>
-                <a:rPr lang="en-US" sz="1000" b="1" dirty="0" smtClean="0">
-                  <a:solidFill>
-                    <a:srgbClr val="FF0000"/>
-                  </a:solidFill>
-                </a:rPr>
-                <a:t>hermal</a:t>
+                <a:t>thermal</a:t>
               </a:r>
               <a:endParaRPr lang="en-US" sz="1000" b="1" dirty="0">
                 <a:solidFill>
@@ -7265,7 +6228,7 @@
             <p:nvPr>
               <p:extLst>
                 <p:ext uri="{D42A27DB-BD31-4B8C-83A1-F6EECF244321}">
-                  <p14:modId xmlns:p14="http://schemas.microsoft.com/office/powerpoint/2010/main" val="3552986279"/>
+                  <p14:modId xmlns:p14="http://schemas.microsoft.com/office/powerpoint/2010/main" xmlns="" val="3552986279"/>
                 </p:ext>
               </p:extLst>
             </p:nvPr>
@@ -7276,44 +6239,9 @@
           </p:xfrm>
           <a:graphic>
             <a:graphicData uri="http://schemas.openxmlformats.org/presentationml/2006/ole">
-              <mc:AlternateContent xmlns:mc="http://schemas.openxmlformats.org/markup-compatibility/2006">
-                <mc:Choice xmlns:v="urn:schemas-microsoft-com:vml" Requires="v">
-                  <p:oleObj spid="_x0000_s3079" name="Equation" r:id="rId4" imgW="190500" imgH="266700" progId="Equation.3">
-                    <p:embed/>
-                  </p:oleObj>
-                </mc:Choice>
-                <mc:Fallback>
-                  <p:oleObj name="Equation" r:id="rId4" imgW="190500" imgH="266700" progId="Equation.3">
-                    <p:embed/>
-                    <p:pic>
-                      <p:nvPicPr>
-                        <p:cNvPr id="0" name=""/>
-                        <p:cNvPicPr>
-                          <a:picLocks noChangeAspect="1" noChangeArrowheads="1"/>
-                        </p:cNvPicPr>
-                        <p:nvPr/>
-                      </p:nvPicPr>
-                      <p:blipFill>
-                        <a:blip r:embed="rId5"/>
-                        <a:srcRect/>
-                        <a:stretch>
-                          <a:fillRect/>
-                        </a:stretch>
-                      </p:blipFill>
-                      <p:spPr bwMode="auto">
-                        <a:xfrm>
-                          <a:off x="1138" y="179"/>
-                          <a:ext cx="120" cy="168"/>
-                        </a:xfrm>
-                        <a:prstGeom prst="rect">
-                          <a:avLst/>
-                        </a:prstGeom>
-                        <a:noFill/>
-                      </p:spPr>
-                    </p:pic>
-                  </p:oleObj>
-                </mc:Fallback>
-              </mc:AlternateContent>
+              <p:oleObj spid="_x0000_s3079" name="Equation" r:id="rId4" imgW="182520" imgH="255960" progId="Equation.3">
+                <p:embed/>
+              </p:oleObj>
             </a:graphicData>
           </a:graphic>
         </p:graphicFrame>
@@ -7326,7 +6254,7 @@
             <p:nvPr>
               <p:extLst>
                 <p:ext uri="{D42A27DB-BD31-4B8C-83A1-F6EECF244321}">
-                  <p14:modId xmlns:p14="http://schemas.microsoft.com/office/powerpoint/2010/main" val="3608044582"/>
+                  <p14:modId xmlns:p14="http://schemas.microsoft.com/office/powerpoint/2010/main" xmlns="" val="3608044582"/>
                 </p:ext>
               </p:extLst>
             </p:nvPr>
@@ -7337,53 +6265,9 @@
           </p:xfrm>
           <a:graphic>
             <a:graphicData uri="http://schemas.openxmlformats.org/presentationml/2006/ole">
-              <mc:AlternateContent xmlns:mc="http://schemas.openxmlformats.org/markup-compatibility/2006">
-                <mc:Choice xmlns:v="urn:schemas-microsoft-com:vml" Requires="v">
-                  <p:oleObj spid="_x0000_s3080" name="Equation" r:id="rId6" imgW="177800" imgH="266700" progId="Equation.3">
-                    <p:embed/>
-                  </p:oleObj>
-                </mc:Choice>
-                <mc:Fallback>
-                  <p:oleObj name="Equation" r:id="rId6" imgW="177800" imgH="266700" progId="Equation.3">
-                    <p:embed/>
-                    <p:pic>
-                      <p:nvPicPr>
-                        <p:cNvPr id="0" name=""/>
-                        <p:cNvPicPr>
-                          <a:picLocks noChangeAspect="1" noChangeArrowheads="1"/>
-                        </p:cNvPicPr>
-                        <p:nvPr/>
-                      </p:nvPicPr>
-                      <p:blipFill>
-                        <a:blip r:embed="rId7"/>
-                        <a:srcRect/>
-                        <a:stretch>
-                          <a:fillRect/>
-                        </a:stretch>
-                      </p:blipFill>
-                      <p:spPr bwMode="auto">
-                        <a:xfrm>
-                          <a:off x="1354" y="487"/>
-                          <a:ext cx="112" cy="168"/>
-                        </a:xfrm>
-                        <a:prstGeom prst="rect">
-                          <a:avLst/>
-                        </a:prstGeom>
-                        <a:noFill/>
-                        <a:extLst>
-                          <a:ext uri="{909E8E84-426E-40dd-AFC4-6F175D3DCCD1}">
-                            <a14:hiddenFill xmlns:a14="http://schemas.microsoft.com/office/drawing/2010/main">
-                              <a:solidFill>
-                                <a:srgbClr val="FFFFFF"/>
-                              </a:solidFill>
-                            </a14:hiddenFill>
-                          </a:ext>
-                        </a:extLst>
-                      </p:spPr>
-                    </p:pic>
-                  </p:oleObj>
-                </mc:Fallback>
-              </mc:AlternateContent>
+              <p:oleObj spid="_x0000_s3080" name="Equation" r:id="rId5" imgW="164520" imgH="255960" progId="Equation.3">
+                <p:embed/>
+              </p:oleObj>
             </a:graphicData>
           </a:graphic>
         </p:graphicFrame>
@@ -7396,7 +6280,7 @@
             <p:nvPr>
               <p:extLst>
                 <p:ext uri="{D42A27DB-BD31-4B8C-83A1-F6EECF244321}">
-                  <p14:modId xmlns:p14="http://schemas.microsoft.com/office/powerpoint/2010/main" val="840994857"/>
+                  <p14:modId xmlns:p14="http://schemas.microsoft.com/office/powerpoint/2010/main" xmlns="" val="840994857"/>
                 </p:ext>
               </p:extLst>
             </p:nvPr>
@@ -7407,53 +6291,9 @@
           </p:xfrm>
           <a:graphic>
             <a:graphicData uri="http://schemas.openxmlformats.org/presentationml/2006/ole">
-              <mc:AlternateContent xmlns:mc="http://schemas.openxmlformats.org/markup-compatibility/2006">
-                <mc:Choice xmlns:v="urn:schemas-microsoft-com:vml" Requires="v">
-                  <p:oleObj spid="_x0000_s3081" name="Equation" r:id="rId8" imgW="190500" imgH="266700" progId="Equation.3">
-                    <p:embed/>
-                  </p:oleObj>
-                </mc:Choice>
-                <mc:Fallback>
-                  <p:oleObj name="Equation" r:id="rId8" imgW="190500" imgH="266700" progId="Equation.3">
-                    <p:embed/>
-                    <p:pic>
-                      <p:nvPicPr>
-                        <p:cNvPr id="0" name=""/>
-                        <p:cNvPicPr>
-                          <a:picLocks noChangeAspect="1" noChangeArrowheads="1"/>
-                        </p:cNvPicPr>
-                        <p:nvPr/>
-                      </p:nvPicPr>
-                      <p:blipFill>
-                        <a:blip r:embed="rId9"/>
-                        <a:srcRect/>
-                        <a:stretch>
-                          <a:fillRect/>
-                        </a:stretch>
-                      </p:blipFill>
-                      <p:spPr bwMode="auto">
-                        <a:xfrm>
-                          <a:off x="1020" y="1347"/>
-                          <a:ext cx="120" cy="168"/>
-                        </a:xfrm>
-                        <a:prstGeom prst="rect">
-                          <a:avLst/>
-                        </a:prstGeom>
-                        <a:noFill/>
-                        <a:extLst>
-                          <a:ext uri="{909E8E84-426E-40dd-AFC4-6F175D3DCCD1}">
-                            <a14:hiddenFill xmlns:a14="http://schemas.microsoft.com/office/drawing/2010/main">
-                              <a:solidFill>
-                                <a:srgbClr val="FFFFFF"/>
-                              </a:solidFill>
-                            </a14:hiddenFill>
-                          </a:ext>
-                        </a:extLst>
-                      </p:spPr>
-                    </p:pic>
-                  </p:oleObj>
-                </mc:Fallback>
-              </mc:AlternateContent>
+              <p:oleObj spid="_x0000_s3081" name="Equation" r:id="rId6" imgW="182520" imgH="255960" progId="Equation.3">
+                <p:embed/>
+              </p:oleObj>
             </a:graphicData>
           </a:graphic>
         </p:graphicFrame>
@@ -7471,59 +6311,9 @@
           </p:xfrm>
           <a:graphic>
             <a:graphicData uri="http://schemas.openxmlformats.org/presentationml/2006/ole">
-              <mc:AlternateContent xmlns:mc="http://schemas.openxmlformats.org/markup-compatibility/2006">
-                <mc:Choice xmlns:v="urn:schemas-microsoft-com:vml" Requires="v">
-                  <p:oleObj spid="_x0000_s3082" name="Equation" r:id="rId10" imgW="152280" imgH="164880" progId="Equation.DSMT4">
-                    <p:embed/>
-                  </p:oleObj>
-                </mc:Choice>
-                <mc:Fallback>
-                  <p:oleObj name="Equation" r:id="rId10" imgW="152280" imgH="164880" progId="Equation.DSMT4">
-                    <p:embed/>
-                    <p:pic>
-                      <p:nvPicPr>
-                        <p:cNvPr id="0" name=""/>
-                        <p:cNvPicPr>
-                          <a:picLocks noChangeAspect="1" noChangeArrowheads="1"/>
-                        </p:cNvPicPr>
-                        <p:nvPr/>
-                      </p:nvPicPr>
-                      <p:blipFill>
-                        <a:blip r:embed="rId11">
-                          <a:extLst>
-                            <a:ext uri="{28A0092B-C50C-407E-A947-70E740481C1C}">
-                              <a14:useLocalDpi xmlns:a14="http://schemas.microsoft.com/office/drawing/2010/main" val="0"/>
-                            </a:ext>
-                          </a:extLst>
-                        </a:blip>
-                        <a:srcRect/>
-                        <a:stretch>
-                          <a:fillRect/>
-                        </a:stretch>
-                      </p:blipFill>
-                      <p:spPr bwMode="auto">
-                        <a:xfrm>
-                          <a:off x="743" y="612"/>
-                          <a:ext cx="96" cy="104"/>
-                        </a:xfrm>
-                        <a:prstGeom prst="rect">
-                          <a:avLst/>
-                        </a:prstGeom>
-                        <a:noFill/>
-                        <a:extLst>
-                          <a:ext uri="{909E8E84-426E-40dd-AFC4-6F175D3DCCD1}">
-                            <a14:hiddenFill xmlns:a14="http://schemas.microsoft.com/office/drawing/2010/main">
-                              <a:solidFill>
-                                <a:srgbClr val="FFFFFF"/>
-                              </a:solidFill>
-                            </a14:hiddenFill>
-                          </a:ext>
-                        </a:extLst>
-                      </p:spPr>
-                    </p:pic>
-                  </p:oleObj>
-                </mc:Fallback>
-              </mc:AlternateContent>
+              <p:oleObj spid="_x0000_s3082" name="Equation" r:id="rId7" imgW="152216" imgH="164901" progId="Equation.DSMT4">
+                <p:embed/>
+              </p:oleObj>
             </a:graphicData>
           </a:graphic>
         </p:graphicFrame>
@@ -7541,59 +6331,9 @@
           </p:xfrm>
           <a:graphic>
             <a:graphicData uri="http://schemas.openxmlformats.org/presentationml/2006/ole">
-              <mc:AlternateContent xmlns:mc="http://schemas.openxmlformats.org/markup-compatibility/2006">
-                <mc:Choice xmlns:v="urn:schemas-microsoft-com:vml" Requires="v">
-                  <p:oleObj spid="_x0000_s3083" name="Equation" r:id="rId12" imgW="126720" imgH="164880" progId="Equation.DSMT4">
-                    <p:embed/>
-                  </p:oleObj>
-                </mc:Choice>
-                <mc:Fallback>
-                  <p:oleObj name="Equation" r:id="rId12" imgW="126720" imgH="164880" progId="Equation.DSMT4">
-                    <p:embed/>
-                    <p:pic>
-                      <p:nvPicPr>
-                        <p:cNvPr id="0" name=""/>
-                        <p:cNvPicPr>
-                          <a:picLocks noChangeAspect="1" noChangeArrowheads="1"/>
-                        </p:cNvPicPr>
-                        <p:nvPr/>
-                      </p:nvPicPr>
-                      <p:blipFill>
-                        <a:blip r:embed="rId13">
-                          <a:extLst>
-                            <a:ext uri="{28A0092B-C50C-407E-A947-70E740481C1C}">
-                              <a14:useLocalDpi xmlns:a14="http://schemas.microsoft.com/office/drawing/2010/main" val="0"/>
-                            </a:ext>
-                          </a:extLst>
-                        </a:blip>
-                        <a:srcRect/>
-                        <a:stretch>
-                          <a:fillRect/>
-                        </a:stretch>
-                      </p:blipFill>
-                      <p:spPr bwMode="auto">
-                        <a:xfrm>
-                          <a:off x="1102" y="473"/>
-                          <a:ext cx="80" cy="104"/>
-                        </a:xfrm>
-                        <a:prstGeom prst="rect">
-                          <a:avLst/>
-                        </a:prstGeom>
-                        <a:noFill/>
-                        <a:extLst>
-                          <a:ext uri="{909E8E84-426E-40dd-AFC4-6F175D3DCCD1}">
-                            <a14:hiddenFill xmlns:a14="http://schemas.microsoft.com/office/drawing/2010/main">
-                              <a:solidFill>
-                                <a:srgbClr val="FFFFFF"/>
-                              </a:solidFill>
-                            </a14:hiddenFill>
-                          </a:ext>
-                        </a:extLst>
-                      </p:spPr>
-                    </p:pic>
-                  </p:oleObj>
-                </mc:Fallback>
-              </mc:AlternateContent>
+              <p:oleObj spid="_x0000_s3083" name="Equation" r:id="rId8" imgW="126770" imgH="164801" progId="Equation.DSMT4">
+                <p:embed/>
+              </p:oleObj>
             </a:graphicData>
           </a:graphic>
         </p:graphicFrame>
@@ -7611,59 +6351,9 @@
           </p:xfrm>
           <a:graphic>
             <a:graphicData uri="http://schemas.openxmlformats.org/presentationml/2006/ole">
-              <mc:AlternateContent xmlns:mc="http://schemas.openxmlformats.org/markup-compatibility/2006">
-                <mc:Choice xmlns:v="urn:schemas-microsoft-com:vml" Requires="v">
-                  <p:oleObj spid="_x0000_s3084" name="Equation" r:id="rId14" imgW="139680" imgH="177480" progId="Equation.DSMT4">
-                    <p:embed/>
-                  </p:oleObj>
-                </mc:Choice>
-                <mc:Fallback>
-                  <p:oleObj name="Equation" r:id="rId14" imgW="139680" imgH="177480" progId="Equation.DSMT4">
-                    <p:embed/>
-                    <p:pic>
-                      <p:nvPicPr>
-                        <p:cNvPr id="0" name=""/>
-                        <p:cNvPicPr>
-                          <a:picLocks noChangeAspect="1" noChangeArrowheads="1"/>
-                        </p:cNvPicPr>
-                        <p:nvPr/>
-                      </p:nvPicPr>
-                      <p:blipFill>
-                        <a:blip r:embed="rId15">
-                          <a:extLst>
-                            <a:ext uri="{28A0092B-C50C-407E-A947-70E740481C1C}">
-                              <a14:useLocalDpi xmlns:a14="http://schemas.microsoft.com/office/drawing/2010/main" val="0"/>
-                            </a:ext>
-                          </a:extLst>
-                        </a:blip>
-                        <a:srcRect/>
-                        <a:stretch>
-                          <a:fillRect/>
-                        </a:stretch>
-                      </p:blipFill>
-                      <p:spPr bwMode="auto">
-                        <a:xfrm>
-                          <a:off x="1052" y="971"/>
-                          <a:ext cx="88" cy="112"/>
-                        </a:xfrm>
-                        <a:prstGeom prst="rect">
-                          <a:avLst/>
-                        </a:prstGeom>
-                        <a:noFill/>
-                        <a:extLst>
-                          <a:ext uri="{909E8E84-426E-40dd-AFC4-6F175D3DCCD1}">
-                            <a14:hiddenFill xmlns:a14="http://schemas.microsoft.com/office/drawing/2010/main">
-                              <a:solidFill>
-                                <a:srgbClr val="FFFFFF"/>
-                              </a:solidFill>
-                            </a14:hiddenFill>
-                          </a:ext>
-                        </a:extLst>
-                      </p:spPr>
-                    </p:pic>
-                  </p:oleObj>
-                </mc:Fallback>
-              </mc:AlternateContent>
+              <p:oleObj spid="_x0000_s3084" name="Equation" r:id="rId9" imgW="139279" imgH="177815" progId="Equation.DSMT4">
+                <p:embed/>
+              </p:oleObj>
             </a:graphicData>
           </a:graphic>
         </p:graphicFrame>
@@ -8192,14 +6882,13 @@
               <a:rPr lang="en-US" sz="1000" b="1" i="1" dirty="0"/>
               <a:t>y</a:t>
             </a:r>
-            <a:endParaRPr lang="en-US" sz="1000" b="1" i="1" dirty="0"/>
           </a:p>
         </p:txBody>
       </p:sp>
     </p:spTree>
     <p:extLst>
       <p:ext uri="{BB962C8B-B14F-4D97-AF65-F5344CB8AC3E}">
-        <p14:creationId xmlns:p14="http://schemas.microsoft.com/office/powerpoint/2010/main" val="1160995133"/>
+        <p14:creationId xmlns:p14="http://schemas.microsoft.com/office/powerpoint/2010/main" xmlns="" val="1160995133"/>
       </p:ext>
     </p:extLst>
   </p:cSld>
@@ -8209,7 +6898,7 @@
   <p:timing>
     <p:tnLst>
       <p:par>
-        <p:cTn xmlns:p14="http://schemas.microsoft.com/office/powerpoint/2010/main" id="1" dur="indefinite" restart="never" nodeType="tmRoot"/>
+        <p:cTn id="1" dur="indefinite" restart="never" nodeType="tmRoot"/>
       </p:par>
     </p:tnLst>
   </p:timing>

</xml_diff>